<commit_message>
added to pipelines, minor edits to 1st 2 prezzies
</commit_message>
<xml_diff>
--- a/presentations/intro python.pptx
+++ b/presentations/intro python.pptx
@@ -16,11 +16,11 @@
     <p:sldId id="288" r:id="rId7"/>
     <p:sldId id="281" r:id="rId8"/>
     <p:sldId id="285" r:id="rId9"/>
-    <p:sldId id="293" r:id="rId10"/>
-    <p:sldId id="286" r:id="rId11"/>
-    <p:sldId id="287" r:id="rId12"/>
-    <p:sldId id="296" r:id="rId13"/>
-    <p:sldId id="295" r:id="rId14"/>
+    <p:sldId id="286" r:id="rId10"/>
+    <p:sldId id="287" r:id="rId11"/>
+    <p:sldId id="296" r:id="rId12"/>
+    <p:sldId id="295" r:id="rId13"/>
+    <p:sldId id="306" r:id="rId14"/>
     <p:sldId id="297" r:id="rId15"/>
     <p:sldId id="294" r:id="rId16"/>
     <p:sldId id="277" r:id="rId17"/>
@@ -219,7 +219,7 @@
           <a:p>
             <a:fld id="{4DF0DEF9-CF53-407B-BB1F-ECAB7603E458}" type="datetimeFigureOut">
               <a:rPr lang="en-US" smtClean="0"/>
-              <a:t>1/4/2014</a:t>
+              <a:t>1/6/2014</a:t>
             </a:fld>
             <a:endParaRPr lang="en-US"/>
           </a:p>
@@ -931,7 +931,7 @@
           <a:p>
             <a:fld id="{ECD19FB2-3AAB-4D03-B13A-2960828C78E3}" type="datetimeFigureOut">
               <a:rPr lang="en-US" smtClean="0"/>
-              <a:t>1/4/2014</a:t>
+              <a:t>1/6/2014</a:t>
             </a:fld>
             <a:endParaRPr lang="en-US" dirty="0"/>
           </a:p>
@@ -1218,7 +1218,7 @@
           <a:p>
             <a:fld id="{1B80C674-7DFC-42FE-B9CD-82963CDB1557}" type="datetimeFigureOut">
               <a:rPr lang="en-US" smtClean="0"/>
-              <a:t>1/4/2014</a:t>
+              <a:t>1/6/2014</a:t>
             </a:fld>
             <a:endParaRPr lang="en-US" dirty="0"/>
           </a:p>
@@ -1415,7 +1415,7 @@
           <a:p>
             <a:fld id="{2076456F-F47D-4F25-8053-2A695DA0CA7D}" type="datetimeFigureOut">
               <a:rPr lang="en-US" smtClean="0"/>
-              <a:t>1/4/2014</a:t>
+              <a:t>1/6/2014</a:t>
             </a:fld>
             <a:endParaRPr lang="en-US" dirty="0"/>
           </a:p>
@@ -1681,7 +1681,7 @@
           <a:p>
             <a:fld id="{5D6C7379-69CC-4837-9905-BEBA22830C8A}" type="datetimeFigureOut">
               <a:rPr lang="en-US" smtClean="0"/>
-              <a:t>1/4/2014</a:t>
+              <a:t>1/6/2014</a:t>
             </a:fld>
             <a:endParaRPr lang="en-US" dirty="0"/>
           </a:p>
@@ -2112,7 +2112,7 @@
           <a:p>
             <a:fld id="{49EB8B7E-8AEE-4F10-BFEE-C999AD004D36}" type="datetimeFigureOut">
               <a:rPr lang="en-US" smtClean="0"/>
-              <a:t>1/4/2014</a:t>
+              <a:t>1/6/2014</a:t>
             </a:fld>
             <a:endParaRPr lang="en-US" dirty="0"/>
           </a:p>
@@ -2663,7 +2663,7 @@
           <a:p>
             <a:fld id="{8668F3F9-58BC-440B-B37B-805B9055EF92}" type="datetimeFigureOut">
               <a:rPr lang="en-US" smtClean="0"/>
-              <a:t>1/4/2014</a:t>
+              <a:t>1/6/2014</a:t>
             </a:fld>
             <a:endParaRPr lang="en-US" dirty="0"/>
           </a:p>
@@ -3499,7 +3499,7 @@
           <a:p>
             <a:fld id="{0D5A53AF-48EA-489D-8260-9DCAB666386A}" type="datetimeFigureOut">
               <a:rPr lang="en-US" smtClean="0"/>
-              <a:t>1/4/2014</a:t>
+              <a:t>1/6/2014</a:t>
             </a:fld>
             <a:endParaRPr lang="en-US" dirty="0"/>
           </a:p>
@@ -3674,7 +3674,7 @@
           <a:p>
             <a:fld id="{0DED02AE-B9A4-47BD-AF8E-97E16144138B}" type="datetimeFigureOut">
               <a:rPr lang="en-US" smtClean="0"/>
-              <a:t>1/4/2014</a:t>
+              <a:t>1/6/2014</a:t>
             </a:fld>
             <a:endParaRPr lang="en-US" dirty="0"/>
           </a:p>
@@ -3859,7 +3859,7 @@
           <a:p>
             <a:fld id="{CF0FD78B-DB02-4362-BCDC-98A55456977C}" type="datetimeFigureOut">
               <a:rPr lang="en-US" smtClean="0"/>
-              <a:t>1/4/2014</a:t>
+              <a:t>1/6/2014</a:t>
             </a:fld>
             <a:endParaRPr lang="en-US" dirty="0"/>
           </a:p>
@@ -4066,7 +4066,7 @@
           <a:p>
             <a:fld id="{99916976-5D93-46E4-A98A-FAD63E4D0EA8}" type="datetimeFigureOut">
               <a:rPr lang="en-US" smtClean="0"/>
-              <a:t>1/4/2014</a:t>
+              <a:t>1/6/2014</a:t>
             </a:fld>
             <a:endParaRPr lang="en-US" dirty="0"/>
           </a:p>
@@ -4335,7 +4335,7 @@
           <a:p>
             <a:fld id="{0F39F4F5-F4D2-4D2A-AB60-88D37ADCB869}" type="datetimeFigureOut">
               <a:rPr lang="en-US" smtClean="0"/>
-              <a:t>1/4/2014</a:t>
+              <a:t>1/6/2014</a:t>
             </a:fld>
             <a:endParaRPr lang="en-US" dirty="0"/>
           </a:p>
@@ -4579,7 +4579,7 @@
           <a:p>
             <a:fld id="{D23BC6CE-6D1E-47E5-8859-F31AC5380EB2}" type="datetimeFigureOut">
               <a:rPr lang="en-US" smtClean="0"/>
-              <a:t>1/4/2014</a:t>
+              <a:t>1/6/2014</a:t>
             </a:fld>
             <a:endParaRPr lang="en-US" dirty="0"/>
           </a:p>
@@ -4986,7 +4986,7 @@
           <a:p>
             <a:fld id="{B1B4E7C4-4DA4-404D-9965-B13F2DD7D8BF}" type="datetimeFigureOut">
               <a:rPr lang="en-US" smtClean="0"/>
-              <a:t>1/4/2014</a:t>
+              <a:t>1/6/2014</a:t>
             </a:fld>
             <a:endParaRPr lang="en-US" dirty="0"/>
           </a:p>
@@ -5109,7 +5109,7 @@
           <a:p>
             <a:fld id="{476FB7AA-4A53-424F-AD41-70827B6504BA}" type="datetimeFigureOut">
               <a:rPr lang="en-US" smtClean="0"/>
-              <a:t>1/4/2014</a:t>
+              <a:t>1/6/2014</a:t>
             </a:fld>
             <a:endParaRPr lang="en-US" dirty="0"/>
           </a:p>
@@ -5209,7 +5209,7 @@
           <a:p>
             <a:fld id="{E7884882-FB12-4BC8-9960-9AD8104D7FAE}" type="datetimeFigureOut">
               <a:rPr lang="en-US" smtClean="0"/>
-              <a:t>1/4/2014</a:t>
+              <a:t>1/6/2014</a:t>
             </a:fld>
             <a:endParaRPr lang="en-US" dirty="0"/>
           </a:p>
@@ -5489,7 +5489,7 @@
           <a:p>
             <a:fld id="{F7D1BD23-6E54-4D9D-AD88-A2813C73CC25}" type="datetimeFigureOut">
               <a:rPr lang="en-US" smtClean="0"/>
-              <a:t>1/4/2014</a:t>
+              <a:t>1/6/2014</a:t>
             </a:fld>
             <a:endParaRPr lang="en-US" dirty="0"/>
           </a:p>
@@ -5777,7 +5777,7 @@
           <a:p>
             <a:fld id="{1471A834-4F3C-4AF9-9C74-05EC35A0F292}" type="datetimeFigureOut">
               <a:rPr lang="en-US" smtClean="0"/>
-              <a:t>1/4/2014</a:t>
+              <a:t>1/6/2014</a:t>
             </a:fld>
             <a:endParaRPr lang="en-US" dirty="0"/>
           </a:p>
@@ -6022,7 +6022,7 @@
           <a:p>
             <a:fld id="{51CF1133-3259-4C45-BABA-5B62D9C6F78D}" type="datetimeFigureOut">
               <a:rPr lang="en-US" smtClean="0"/>
-              <a:t>1/4/2014</a:t>
+              <a:t>1/6/2014</a:t>
             </a:fld>
             <a:endParaRPr lang="en-US" dirty="0"/>
           </a:p>
@@ -6754,7 +6754,7 @@
           <a:p>
             <a:r>
               <a:rPr lang="en-US" dirty="0" smtClean="0"/>
-              <a:t>Object Oriented Programming</a:t>
+              <a:t>Some Python Object Types</a:t>
             </a:r>
             <a:endParaRPr lang="en-US" dirty="0"/>
           </a:p>
@@ -6770,80 +6770,86 @@
             <p:ph idx="1"/>
           </p:nvPr>
         </p:nvSpPr>
-        <p:spPr>
-          <a:xfrm>
-            <a:off x="840000" y="2029767"/>
-            <a:ext cx="7675350" cy="4451420"/>
-          </a:xfrm>
-        </p:spPr>
-        <p:txBody>
-          <a:bodyPr>
-            <a:normAutofit lnSpcReduction="10000"/>
-          </a:bodyPr>
-          <a:lstStyle/>
-          <a:p>
-            <a:r>
-              <a:rPr lang="en-US" dirty="0" smtClean="0"/>
-              <a:t>Objects hold information</a:t>
-            </a:r>
-          </a:p>
+        <p:spPr/>
+        <p:txBody>
+          <a:bodyPr/>
+          <a:lstStyle/>
           <a:p>
             <a:endParaRPr lang="en-US" dirty="0" smtClean="0"/>
           </a:p>
           <a:p>
             <a:r>
               <a:rPr lang="en-US" dirty="0" smtClean="0"/>
-              <a:t>They can contain values</a:t>
-            </a:r>
-          </a:p>
-          <a:p>
+              <a:t>Numbers</a:t>
+            </a:r>
+          </a:p>
+          <a:p>
+            <a:pPr lvl="1"/>
+            <a:r>
+              <a:rPr lang="en-US" dirty="0" smtClean="0"/>
+              <a:t>Integers (whole numbers): 7</a:t>
+            </a:r>
+          </a:p>
+          <a:p>
+            <a:pPr lvl="1"/>
+            <a:r>
+              <a:rPr lang="en-US" dirty="0" smtClean="0"/>
+              <a:t>Floating point numbers: 7.7</a:t>
+            </a:r>
+          </a:p>
+          <a:p>
+            <a:pPr marL="342900" lvl="1" indent="0">
+              <a:buNone/>
+            </a:pPr>
+            <a:endParaRPr lang="en-US" dirty="0"/>
+          </a:p>
+          <a:p>
+            <a:r>
+              <a:rPr lang="en-US" dirty="0" smtClean="0"/>
+              <a:t>String</a:t>
+            </a:r>
+          </a:p>
+          <a:p>
+            <a:pPr lvl="1"/>
+            <a:r>
+              <a:rPr lang="en-US" dirty="0" smtClean="0"/>
+              <a:t>Sequence of characters: “word!”</a:t>
+            </a:r>
+          </a:p>
+          <a:p>
+            <a:pPr lvl="1"/>
+            <a:endParaRPr lang="en-US" dirty="0"/>
+          </a:p>
+          <a:p>
+            <a:r>
+              <a:rPr lang="en-US" dirty="0" smtClean="0"/>
+              <a:t>Set</a:t>
+            </a:r>
+          </a:p>
+          <a:p>
+            <a:pPr lvl="1"/>
+            <a:r>
+              <a:rPr lang="en-US" dirty="0" smtClean="0"/>
+              <a:t>Unordered and unique collection of objects</a:t>
+            </a:r>
+          </a:p>
+          <a:p>
+            <a:pPr lvl="1"/>
             <a:endParaRPr lang="en-US" dirty="0" smtClean="0"/>
           </a:p>
           <a:p>
-            <a:r>
-              <a:rPr lang="en-US" dirty="0" smtClean="0"/>
-              <a:t>They can contain multiple values</a:t>
-            </a:r>
-            <a:endParaRPr lang="en-US" dirty="0"/>
-          </a:p>
-          <a:p>
-            <a:endParaRPr lang="en-US" dirty="0" smtClean="0"/>
-          </a:p>
-          <a:p>
-            <a:r>
-              <a:rPr lang="en-US" dirty="0" smtClean="0"/>
-              <a:t>They can contain </a:t>
-            </a:r>
-            <a:r>
-              <a:rPr lang="en-US" i="1" dirty="0" smtClean="0"/>
-              <a:t>other objects</a:t>
-            </a:r>
-            <a:endParaRPr lang="en-US" dirty="0" smtClean="0"/>
-          </a:p>
-          <a:p>
-            <a:endParaRPr lang="en-US" dirty="0" smtClean="0"/>
-          </a:p>
-          <a:p>
-            <a:r>
-              <a:rPr lang="en-US" dirty="0" smtClean="0"/>
-              <a:t>They have types</a:t>
-            </a:r>
-          </a:p>
-          <a:p>
-            <a:endParaRPr lang="en-US" dirty="0" smtClean="0"/>
-          </a:p>
-          <a:p>
-            <a:r>
-              <a:rPr lang="en-US" dirty="0" smtClean="0"/>
-              <a:t>They can inherit information from others</a:t>
-            </a:r>
+            <a:pPr lvl="1"/>
+            <a:endParaRPr lang="en-US" dirty="0"/>
+          </a:p>
+          <a:p>
+            <a:endParaRPr lang="en-US" dirty="0"/>
           </a:p>
         </p:txBody>
       </p:sp>
     </p:spTree>
     <p:extLst>
       <p:ext uri="{BB962C8B-B14F-4D97-AF65-F5344CB8AC3E}">
-        <p14:creationId xmlns:p14="http://schemas.microsoft.com/office/powerpoint/2010/main" val="4039615631"/>
+        <p14:creationId xmlns:p14="http://schemas.microsoft.com/office/powerpoint/2010/main" val="4015696490"/>
       </p:ext>
     </p:extLst>
   </p:cSld>
@@ -6886,10 +6892,9 @@
           <a:lstStyle/>
           <a:p>
             <a:r>
-              <a:rPr lang="en-US" dirty="0" smtClean="0"/>
+              <a:rPr lang="en-US" dirty="0"/>
               <a:t>Some Python Object Types</a:t>
             </a:r>
-            <a:endParaRPr lang="en-US" dirty="0"/>
           </a:p>
         </p:txBody>
       </p:sp>
@@ -6908,26 +6913,46 @@
           <a:bodyPr/>
           <a:lstStyle/>
           <a:p>
-            <a:endParaRPr lang="en-US" dirty="0" smtClean="0"/>
-          </a:p>
-          <a:p>
-            <a:r>
-              <a:rPr lang="en-US" dirty="0" smtClean="0"/>
-              <a:t>Numbers</a:t>
+            <a:r>
+              <a:rPr lang="en-US" dirty="0"/>
+              <a:t>List</a:t>
             </a:r>
           </a:p>
           <a:p>
             <a:pPr lvl="1"/>
             <a:r>
-              <a:rPr lang="en-US" dirty="0" smtClean="0"/>
-              <a:t>Integers (whole numbers): 7</a:t>
+              <a:rPr lang="en-US" dirty="0"/>
+              <a:t>An ordered list of objects:</a:t>
             </a:r>
           </a:p>
           <a:p>
             <a:pPr lvl="1"/>
             <a:r>
               <a:rPr lang="en-US" dirty="0" smtClean="0"/>
-              <a:t>Floating point numbers: 7.7</a:t>
+              <a:t>[2, 4, 7, 22]</a:t>
+            </a:r>
+          </a:p>
+          <a:p>
+            <a:pPr lvl="1"/>
+            <a:r>
+              <a:rPr lang="en-US" dirty="0" smtClean="0"/>
+              <a:t>[“</a:t>
+            </a:r>
+            <a:r>
+              <a:rPr lang="en-US" dirty="0" err="1" smtClean="0"/>
+              <a:t>acgta</a:t>
+            </a:r>
+            <a:r>
+              <a:rPr lang="en-US" dirty="0" smtClean="0"/>
+              <a:t>”, “</a:t>
+            </a:r>
+            <a:r>
+              <a:rPr lang="en-US" dirty="0" err="1" smtClean="0"/>
+              <a:t>gtaagt</a:t>
+            </a:r>
+            <a:r>
+              <a:rPr lang="en-US" dirty="0" smtClean="0"/>
+              <a:t>”]</a:t>
             </a:r>
           </a:p>
           <a:p>
@@ -6939,39 +6964,34 @@
           <a:p>
             <a:r>
               <a:rPr lang="en-US" dirty="0" smtClean="0"/>
-              <a:t>String</a:t>
+              <a:t>Dictionary</a:t>
             </a:r>
           </a:p>
           <a:p>
             <a:pPr lvl="1"/>
             <a:r>
               <a:rPr lang="en-US" dirty="0" smtClean="0"/>
-              <a:t>Sequence of characters: “word!”</a:t>
-            </a:r>
+              <a:t>“associative arrays”</a:t>
+            </a:r>
+            <a:endParaRPr lang="en-US" dirty="0"/>
           </a:p>
           <a:p>
             <a:pPr lvl="1"/>
-            <a:endParaRPr lang="en-US" dirty="0"/>
-          </a:p>
-          <a:p>
-            <a:r>
-              <a:rPr lang="en-US" dirty="0" smtClean="0"/>
-              <a:t>Set</a:t>
+            <a:r>
+              <a:rPr lang="en-US" dirty="0"/>
+              <a:t>A collection of key -&gt; </a:t>
+            </a:r>
+            <a:r>
+              <a:rPr lang="en-US" dirty="0" smtClean="0"/>
+              <a:t>values</a:t>
             </a:r>
           </a:p>
           <a:p>
             <a:pPr lvl="1"/>
             <a:r>
               <a:rPr lang="en-US" dirty="0" smtClean="0"/>
-              <a:t>Unordered and unique collection of objects</a:t>
-            </a:r>
-          </a:p>
-          <a:p>
-            <a:pPr lvl="1"/>
-            <a:endParaRPr lang="en-US" dirty="0" smtClean="0"/>
-          </a:p>
-          <a:p>
-            <a:pPr lvl="1"/>
+              <a:t>{“age”:13, “address”: “123 street”}</a:t>
+            </a:r>
             <a:endParaRPr lang="en-US" dirty="0"/>
           </a:p>
           <a:p>
@@ -6982,7 +7002,7 @@
     </p:spTree>
     <p:extLst>
       <p:ext uri="{BB962C8B-B14F-4D97-AF65-F5344CB8AC3E}">
-        <p14:creationId xmlns:p14="http://schemas.microsoft.com/office/powerpoint/2010/main" val="4015696490"/>
+        <p14:creationId xmlns:p14="http://schemas.microsoft.com/office/powerpoint/2010/main" val="418909026"/>
       </p:ext>
     </p:extLst>
   </p:cSld>
@@ -7025,109 +7045,147 @@
           <a:lstStyle/>
           <a:p>
             <a:r>
+              <a:rPr lang="en-US" dirty="0" smtClean="0"/>
+              <a:t>Programming Logic</a:t>
+            </a:r>
+            <a:endParaRPr lang="en-US" dirty="0"/>
+          </a:p>
+        </p:txBody>
+      </p:sp>
+      <p:sp>
+        <p:nvSpPr>
+          <p:cNvPr id="3" name="Content Placeholder 2"/>
+          <p:cNvSpPr>
+            <a:spLocks noGrp="1"/>
+          </p:cNvSpPr>
+          <p:nvPr>
+            <p:ph idx="1"/>
+          </p:nvPr>
+        </p:nvSpPr>
+        <p:spPr/>
+        <p:txBody>
+          <a:bodyPr>
+            <a:normAutofit/>
+          </a:bodyPr>
+          <a:lstStyle/>
+          <a:p>
+            <a:r>
+              <a:rPr lang="en-US" dirty="0" smtClean="0"/>
+              <a:t>If/else</a:t>
+            </a:r>
+          </a:p>
+          <a:p>
+            <a:pPr lvl="1"/>
+            <a:r>
+              <a:rPr lang="en-US" dirty="0" smtClean="0"/>
+              <a:t>Conditional logic!</a:t>
+            </a:r>
+          </a:p>
+          <a:p>
+            <a:pPr lvl="1"/>
+            <a:r>
+              <a:rPr lang="en-US" dirty="0" smtClean="0"/>
+              <a:t>Allows you to control the flow of behavior</a:t>
+            </a:r>
+          </a:p>
+          <a:p>
+            <a:pPr lvl="1"/>
+            <a:r>
+              <a:rPr lang="en-US" dirty="0" smtClean="0"/>
+              <a:t>If it rains today </a:t>
+            </a:r>
+            <a:r>
+              <a:rPr lang="en-US" dirty="0" smtClean="0"/>
+              <a:t>I will bring an umbrella</a:t>
+            </a:r>
+          </a:p>
+          <a:p>
+            <a:pPr marL="342900" lvl="1" indent="0">
+              <a:buNone/>
+            </a:pPr>
+            <a:endParaRPr lang="en-US" dirty="0" smtClean="0"/>
+          </a:p>
+          <a:p>
+            <a:pPr marL="342900" lvl="1" indent="0">
+              <a:buNone/>
+            </a:pPr>
+            <a:r>
+              <a:rPr lang="en-US" dirty="0" smtClean="0"/>
+              <a:t>if raining == true:</a:t>
+            </a:r>
+          </a:p>
+          <a:p>
+            <a:pPr marL="342900" lvl="1" indent="0">
+              <a:buNone/>
+            </a:pPr>
+            <a:r>
               <a:rPr lang="en-US" dirty="0"/>
-              <a:t>Some Python Object Types</a:t>
-            </a:r>
-          </a:p>
-        </p:txBody>
-      </p:sp>
-      <p:sp>
-        <p:nvSpPr>
-          <p:cNvPr id="3" name="Content Placeholder 2"/>
-          <p:cNvSpPr>
-            <a:spLocks noGrp="1"/>
-          </p:cNvSpPr>
-          <p:nvPr>
-            <p:ph idx="1"/>
-          </p:nvPr>
-        </p:nvSpPr>
-        <p:spPr/>
-        <p:txBody>
-          <a:bodyPr/>
-          <a:lstStyle/>
-          <a:p>
+              <a:t>	</a:t>
+            </a:r>
+            <a:r>
+              <a:rPr lang="en-US" dirty="0" err="1" smtClean="0"/>
+              <a:t>bring_umbrella</a:t>
+            </a:r>
+            <a:r>
+              <a:rPr lang="en-US" dirty="0" smtClean="0"/>
+              <a:t>()</a:t>
+            </a:r>
+          </a:p>
+          <a:p>
+            <a:pPr marL="342900" lvl="1" indent="0">
+              <a:buNone/>
+            </a:pPr>
+            <a:r>
+              <a:rPr lang="en-US" dirty="0" err="1" smtClean="0"/>
+              <a:t>elif</a:t>
+            </a:r>
+            <a:r>
+              <a:rPr lang="en-US" dirty="0" smtClean="0"/>
+              <a:t> snowing == true:</a:t>
+            </a:r>
+          </a:p>
+          <a:p>
+            <a:pPr marL="342900" lvl="1" indent="0">
+              <a:buNone/>
+            </a:pPr>
             <a:r>
               <a:rPr lang="en-US" dirty="0"/>
-              <a:t>List</a:t>
-            </a:r>
-          </a:p>
-          <a:p>
-            <a:pPr lvl="1"/>
+              <a:t>	</a:t>
+            </a:r>
+            <a:r>
+              <a:rPr lang="en-US" dirty="0" err="1" smtClean="0"/>
+              <a:t>wear_snowboots</a:t>
+            </a:r>
+            <a:r>
+              <a:rPr lang="en-US" dirty="0" smtClean="0"/>
+              <a:t>()</a:t>
+            </a:r>
+          </a:p>
+          <a:p>
+            <a:pPr marL="342900" lvl="1" indent="0">
+              <a:buNone/>
+            </a:pPr>
+            <a:r>
+              <a:rPr lang="en-US" dirty="0" smtClean="0"/>
+              <a:t>else:</a:t>
+            </a:r>
+          </a:p>
+          <a:p>
+            <a:pPr marL="342900" lvl="1" indent="0">
+              <a:buNone/>
+            </a:pPr>
             <a:r>
               <a:rPr lang="en-US" dirty="0"/>
-              <a:t>An ordered list of objects:</a:t>
-            </a:r>
-          </a:p>
-          <a:p>
-            <a:pPr lvl="1"/>
-            <a:r>
-              <a:rPr lang="en-US" dirty="0" smtClean="0"/>
-              <a:t>[2, 4, 7, 22]</a:t>
-            </a:r>
-          </a:p>
-          <a:p>
-            <a:pPr lvl="1"/>
-            <a:r>
-              <a:rPr lang="en-US" dirty="0" smtClean="0"/>
-              <a:t>[“</a:t>
+              <a:t>	</a:t>
             </a:r>
             <a:r>
               <a:rPr lang="en-US" dirty="0" err="1" smtClean="0"/>
-              <a:t>acgta</a:t>
-            </a:r>
-            <a:r>
-              <a:rPr lang="en-US" dirty="0" smtClean="0"/>
-              <a:t>”, “</a:t>
-            </a:r>
-            <a:r>
-              <a:rPr lang="en-US" dirty="0" err="1" smtClean="0"/>
-              <a:t>gtaagt</a:t>
-            </a:r>
-            <a:r>
-              <a:rPr lang="en-US" dirty="0" smtClean="0"/>
-              <a:t>”]</a:t>
-            </a:r>
-          </a:p>
-          <a:p>
-            <a:pPr marL="342900" lvl="1" indent="0">
-              <a:buNone/>
-            </a:pPr>
-            <a:endParaRPr lang="en-US" dirty="0"/>
-          </a:p>
-          <a:p>
-            <a:r>
-              <a:rPr lang="en-US" dirty="0" smtClean="0"/>
-              <a:t>Dictionary</a:t>
-            </a:r>
-          </a:p>
-          <a:p>
-            <a:pPr lvl="1"/>
-            <a:r>
-              <a:rPr lang="en-US" dirty="0" smtClean="0"/>
-              <a:t>“associative arrays”</a:t>
-            </a:r>
-            <a:endParaRPr lang="en-US" dirty="0"/>
-          </a:p>
-          <a:p>
-            <a:pPr lvl="1"/>
-            <a:r>
-              <a:rPr lang="en-US" dirty="0"/>
-              <a:t>A collection of key -&gt; </a:t>
-            </a:r>
-            <a:r>
-              <a:rPr lang="en-US" dirty="0" smtClean="0"/>
-              <a:t>values</a:t>
-            </a:r>
-          </a:p>
-          <a:p>
-            <a:pPr lvl="1"/>
-            <a:r>
-              <a:rPr lang="en-US" dirty="0" smtClean="0"/>
-              <a:t>{“age”:13, “address”: “123 street”}</a:t>
-            </a:r>
-            <a:endParaRPr lang="en-US" dirty="0"/>
-          </a:p>
-          <a:p>
+              <a:t>rock_sunglasses</a:t>
+            </a:r>
+            <a:r>
+              <a:rPr lang="en-US" dirty="0" smtClean="0"/>
+              <a:t>()</a:t>
+            </a:r>
             <a:endParaRPr lang="en-US" dirty="0"/>
           </a:p>
         </p:txBody>
@@ -7135,7 +7193,7 @@
     </p:spTree>
     <p:extLst>
       <p:ext uri="{BB962C8B-B14F-4D97-AF65-F5344CB8AC3E}">
-        <p14:creationId xmlns:p14="http://schemas.microsoft.com/office/powerpoint/2010/main" val="418909026"/>
+        <p14:creationId xmlns:p14="http://schemas.microsoft.com/office/powerpoint/2010/main" val="1882223815"/>
       </p:ext>
     </p:extLst>
   </p:cSld>
@@ -7197,60 +7255,116 @@
         </p:nvSpPr>
         <p:spPr/>
         <p:txBody>
-          <a:bodyPr/>
-          <a:lstStyle/>
-          <a:p>
-            <a:r>
-              <a:rPr lang="en-US" dirty="0" smtClean="0"/>
-              <a:t>If/else</a:t>
+          <a:bodyPr>
+            <a:normAutofit/>
+          </a:bodyPr>
+          <a:lstStyle/>
+          <a:p>
+            <a:r>
+              <a:rPr lang="en-US" dirty="0"/>
+              <a:t>For or while loops</a:t>
             </a:r>
           </a:p>
           <a:p>
             <a:pPr lvl="1"/>
             <a:r>
-              <a:rPr lang="en-US" dirty="0" smtClean="0"/>
-              <a:t>Conditional logic!</a:t>
+              <a:rPr lang="en-US" dirty="0"/>
+              <a:t>Do something several times</a:t>
             </a:r>
           </a:p>
           <a:p>
             <a:pPr lvl="1"/>
             <a:r>
-              <a:rPr lang="en-US" dirty="0" smtClean="0"/>
-              <a:t>Allows you to control the flow of behavior</a:t>
-            </a:r>
-          </a:p>
-          <a:p>
-            <a:pPr lvl="1"/>
-            <a:r>
-              <a:rPr lang="en-US" dirty="0" smtClean="0"/>
-              <a:t>If it rains today </a:t>
-            </a:r>
-            <a:endParaRPr lang="en-US" dirty="0"/>
+              <a:rPr lang="en-US" dirty="0"/>
+              <a:t>Make sure you understand when or if things stop</a:t>
+            </a:r>
+            <a:r>
+              <a:rPr lang="en-US" dirty="0" smtClean="0"/>
+              <a:t>!</a:t>
+            </a:r>
           </a:p>
           <a:p>
             <a:pPr marL="342900" lvl="1" indent="0">
               <a:buNone/>
             </a:pPr>
-            <a:endParaRPr lang="en-US" dirty="0" smtClean="0"/>
-          </a:p>
-          <a:p>
-            <a:r>
-              <a:rPr lang="en-US" dirty="0" smtClean="0"/>
-              <a:t>For or while loops</a:t>
-            </a:r>
-          </a:p>
-          <a:p>
-            <a:pPr lvl="1"/>
-            <a:r>
-              <a:rPr lang="en-US" dirty="0" smtClean="0"/>
-              <a:t>Do something several times</a:t>
-            </a:r>
-          </a:p>
-          <a:p>
-            <a:pPr lvl="1"/>
-            <a:r>
-              <a:rPr lang="en-US" dirty="0" smtClean="0"/>
-              <a:t>Make sure you understand when or if things stop!</a:t>
+            <a:endParaRPr lang="en-US" dirty="0"/>
+          </a:p>
+          <a:p>
+            <a:pPr marL="342900" lvl="1" indent="0">
+              <a:buNone/>
+            </a:pPr>
+            <a:r>
+              <a:rPr lang="en-US" dirty="0"/>
+              <a:t>w</a:t>
+            </a:r>
+            <a:r>
+              <a:rPr lang="en-US" dirty="0" smtClean="0"/>
+              <a:t>hile ben == “awesome”:</a:t>
+            </a:r>
+          </a:p>
+          <a:p>
+            <a:pPr marL="342900" lvl="1" indent="0">
+              <a:buNone/>
+            </a:pPr>
+            <a:r>
+              <a:rPr lang="en-US" dirty="0"/>
+              <a:t>	</a:t>
+            </a:r>
+            <a:r>
+              <a:rPr lang="en-US" dirty="0" smtClean="0"/>
+              <a:t>dance_like_its_1999()</a:t>
+            </a:r>
+          </a:p>
+          <a:p>
+            <a:pPr marL="342900" lvl="1" indent="0">
+              <a:buNone/>
+            </a:pPr>
+            <a:endParaRPr lang="en-US" dirty="0"/>
+          </a:p>
+          <a:p>
+            <a:pPr marL="342900" lvl="1" indent="0">
+              <a:buNone/>
+            </a:pPr>
+            <a:r>
+              <a:rPr lang="en-US" dirty="0" smtClean="0"/>
+              <a:t>for </a:t>
+            </a:r>
+            <a:r>
+              <a:rPr lang="en-US" dirty="0" err="1" smtClean="0"/>
+              <a:t>dance_move</a:t>
+            </a:r>
+            <a:r>
+              <a:rPr lang="en-US" dirty="0" smtClean="0"/>
+              <a:t> in </a:t>
+            </a:r>
+            <a:r>
+              <a:rPr lang="en-US" dirty="0" err="1" smtClean="0"/>
+              <a:t>list_of_dance_moves</a:t>
+            </a:r>
+            <a:r>
+              <a:rPr lang="en-US" dirty="0" smtClean="0"/>
+              <a:t>:</a:t>
+            </a:r>
+          </a:p>
+          <a:p>
+            <a:pPr marL="342900" lvl="1" indent="0">
+              <a:buNone/>
+            </a:pPr>
+            <a:r>
+              <a:rPr lang="en-US" dirty="0"/>
+              <a:t>	</a:t>
+            </a:r>
+            <a:r>
+              <a:rPr lang="en-US" dirty="0" smtClean="0"/>
+              <a:t>dance(</a:t>
+            </a:r>
+            <a:r>
+              <a:rPr lang="en-US" dirty="0" err="1" smtClean="0"/>
+              <a:t>dance_move</a:t>
+            </a:r>
+            <a:r>
+              <a:rPr lang="en-US" dirty="0" smtClean="0"/>
+              <a:t>)</a:t>
             </a:r>
             <a:endParaRPr lang="en-US" dirty="0"/>
           </a:p>
@@ -7259,7 +7373,7 @@
     </p:spTree>
     <p:extLst>
       <p:ext uri="{BB962C8B-B14F-4D97-AF65-F5344CB8AC3E}">
-        <p14:creationId xmlns:p14="http://schemas.microsoft.com/office/powerpoint/2010/main" val="1882223815"/>
+        <p14:creationId xmlns:p14="http://schemas.microsoft.com/office/powerpoint/2010/main" val="989613303"/>
       </p:ext>
     </p:extLst>
   </p:cSld>
@@ -8078,7 +8192,7 @@
             </a:r>
             <a:r>
               <a:rPr lang="en-US" dirty="0" smtClean="0"/>
-              <a:t>range(1,30):</a:t>
+              <a:t>range(1,31):</a:t>
             </a:r>
             <a:endParaRPr lang="en-US" dirty="0"/>
           </a:p>
@@ -8800,8 +8914,8 @@
         </p:nvSpPr>
         <p:spPr>
           <a:xfrm>
-            <a:off x="1" y="1825625"/>
-            <a:ext cx="9287690" cy="4351338"/>
+            <a:off x="348917" y="2523457"/>
+            <a:ext cx="9287690" cy="2710280"/>
           </a:xfrm>
         </p:spPr>
         <p:txBody>
@@ -8814,15 +8928,15 @@
               <a:buNone/>
             </a:pPr>
             <a:r>
-              <a:rPr lang="en-US" dirty="0"/>
+              <a:rPr lang="en-US" sz="1400" dirty="0"/>
               <a:t>for record in </a:t>
             </a:r>
             <a:r>
-              <a:rPr lang="en-US" dirty="0" err="1"/>
+              <a:rPr lang="en-US" sz="1400" dirty="0" err="1"/>
               <a:t>fastq_file</a:t>
             </a:r>
             <a:r>
-              <a:rPr lang="en-US" dirty="0"/>
+              <a:rPr lang="en-US" sz="1400" dirty="0"/>
               <a:t>:</a:t>
             </a:r>
           </a:p>
@@ -8831,7 +8945,7 @@
               <a:buNone/>
             </a:pPr>
             <a:r>
-              <a:rPr lang="en-US" dirty="0"/>
+              <a:rPr lang="en-US" sz="1400" dirty="0"/>
               <a:t>    #sum of quality scores divided by the length</a:t>
             </a:r>
           </a:p>
@@ -8840,39 +8954,39 @@
               <a:buNone/>
             </a:pPr>
             <a:r>
-              <a:rPr lang="en-US" dirty="0"/>
+              <a:rPr lang="en-US" sz="1400" dirty="0"/>
               <a:t>    </a:t>
             </a:r>
             <a:r>
-              <a:rPr lang="en-US" dirty="0" err="1"/>
+              <a:rPr lang="en-US" sz="1400" dirty="0" err="1"/>
               <a:t>avg_qual</a:t>
             </a:r>
             <a:r>
-              <a:rPr lang="en-US" dirty="0"/>
+              <a:rPr lang="en-US" sz="1400" dirty="0"/>
               <a:t> = sum(</a:t>
             </a:r>
             <a:r>
-              <a:rPr lang="en-US" dirty="0" err="1"/>
+              <a:rPr lang="en-US" sz="1400" dirty="0" err="1"/>
               <a:t>record.letter_annotations</a:t>
             </a:r>
             <a:r>
-              <a:rPr lang="en-US" dirty="0"/>
+              <a:rPr lang="en-US" sz="1400" dirty="0"/>
               <a:t>["</a:t>
             </a:r>
             <a:r>
-              <a:rPr lang="en-US" dirty="0" err="1"/>
+              <a:rPr lang="en-US" sz="1400" dirty="0" err="1"/>
               <a:t>phred_quality</a:t>
             </a:r>
             <a:r>
-              <a:rPr lang="en-US" dirty="0"/>
+              <a:rPr lang="en-US" sz="1400" dirty="0"/>
               <a:t>"]) / </a:t>
             </a:r>
             <a:r>
-              <a:rPr lang="en-US" dirty="0" err="1"/>
+              <a:rPr lang="en-US" sz="1400" dirty="0" err="1"/>
               <a:t>len</a:t>
             </a:r>
             <a:r>
-              <a:rPr lang="en-US" dirty="0"/>
+              <a:rPr lang="en-US" sz="1400" dirty="0"/>
               <a:t>(record)</a:t>
             </a:r>
           </a:p>
@@ -8880,14 +8994,14 @@
             <a:pPr marL="0" indent="0">
               <a:buNone/>
             </a:pPr>
-            <a:endParaRPr lang="en-US" dirty="0"/>
+            <a:endParaRPr lang="en-US" sz="1400" dirty="0"/>
           </a:p>
           <a:p>
             <a:pPr marL="0" indent="0">
               <a:buNone/>
             </a:pPr>
             <a:r>
-              <a:rPr lang="en-US" dirty="0"/>
+              <a:rPr lang="en-US" sz="1400" dirty="0"/>
               <a:t>    #if the read is of sufficient average quality</a:t>
             </a:r>
           </a:p>
@@ -8896,23 +9010,23 @@
               <a:buNone/>
             </a:pPr>
             <a:r>
-              <a:rPr lang="en-US" dirty="0"/>
+              <a:rPr lang="en-US" sz="1400" dirty="0"/>
               <a:t>    if </a:t>
             </a:r>
             <a:r>
-              <a:rPr lang="en-US" dirty="0" err="1"/>
+              <a:rPr lang="en-US" sz="1400" dirty="0" err="1"/>
               <a:t>avg_qual</a:t>
             </a:r>
             <a:r>
-              <a:rPr lang="en-US" dirty="0"/>
+              <a:rPr lang="en-US" sz="1400" dirty="0"/>
               <a:t> &gt; </a:t>
             </a:r>
             <a:r>
-              <a:rPr lang="en-US" dirty="0" err="1"/>
+              <a:rPr lang="en-US" sz="1400" dirty="0" err="1"/>
               <a:t>qual_cutoff</a:t>
             </a:r>
             <a:r>
-              <a:rPr lang="en-US" dirty="0"/>
+              <a:rPr lang="en-US" sz="1400" dirty="0"/>
               <a:t>:</a:t>
             </a:r>
           </a:p>
@@ -8921,15 +9035,15 @@
               <a:buNone/>
             </a:pPr>
             <a:r>
-              <a:rPr lang="en-US" dirty="0"/>
+              <a:rPr lang="en-US" sz="1400" dirty="0"/>
               <a:t>        #print it in </a:t>
             </a:r>
             <a:r>
-              <a:rPr lang="en-US" dirty="0" err="1"/>
+              <a:rPr lang="en-US" sz="1400" dirty="0" err="1"/>
               <a:t>fastq</a:t>
             </a:r>
             <a:r>
-              <a:rPr lang="en-US" dirty="0"/>
+              <a:rPr lang="en-US" sz="1400" dirty="0"/>
               <a:t> format</a:t>
             </a:r>
           </a:p>
@@ -8938,23 +9052,23 @@
               <a:buNone/>
             </a:pPr>
             <a:r>
-              <a:rPr lang="en-US" dirty="0"/>
+              <a:rPr lang="en-US" sz="1400" dirty="0"/>
               <a:t>        print </a:t>
             </a:r>
             <a:r>
-              <a:rPr lang="en-US" dirty="0" err="1"/>
+              <a:rPr lang="en-US" sz="1400" dirty="0" err="1"/>
               <a:t>record.format</a:t>
             </a:r>
             <a:r>
-              <a:rPr lang="en-US" dirty="0"/>
+              <a:rPr lang="en-US" sz="1400" dirty="0"/>
               <a:t>("</a:t>
             </a:r>
             <a:r>
-              <a:rPr lang="en-US" dirty="0" err="1"/>
+              <a:rPr lang="en-US" sz="1400" dirty="0" err="1"/>
               <a:t>fastq</a:t>
             </a:r>
             <a:r>
-              <a:rPr lang="en-US" dirty="0"/>
+              <a:rPr lang="en-US" sz="1400" dirty="0"/>
               <a:t>")</a:t>
             </a:r>
           </a:p>
@@ -10105,212 +10219,96 @@
           <a:p>
             <a:r>
               <a:rPr lang="en-US" dirty="0" smtClean="0"/>
-              <a:t>An Excellent Book</a:t>
-            </a:r>
-            <a:endParaRPr lang="en-US" dirty="0"/>
-          </a:p>
-        </p:txBody>
-      </p:sp>
-      <p:pic>
-        <p:nvPicPr>
-          <p:cNvPr id="3078" name="Picture 6" descr="Practical Computing for Biologists"/>
-          <p:cNvPicPr>
-            <a:picLocks noChangeAspect="1" noChangeArrowheads="1"/>
-          </p:cNvPicPr>
-          <p:nvPr/>
-        </p:nvPicPr>
-        <p:blipFill>
-          <a:blip r:embed="rId2">
-            <a:extLst>
-              <a:ext uri="{28A0092B-C50C-407E-A947-70E740481C1C}">
-                <a14:useLocalDpi xmlns:a14="http://schemas.microsoft.com/office/drawing/2010/main" val="0"/>
-              </a:ext>
-            </a:extLst>
-          </a:blip>
-          <a:srcRect/>
-          <a:stretch>
-            <a:fillRect/>
-          </a:stretch>
-        </p:blipFill>
-        <p:spPr bwMode="auto">
-          <a:xfrm>
-            <a:off x="317151" y="2140299"/>
-            <a:ext cx="3307570" cy="4014316"/>
-          </a:xfrm>
-          <a:prstGeom prst="rect">
-            <a:avLst/>
-          </a:prstGeom>
-          <a:noFill/>
-          <a:extLst>
-            <a:ext uri="{909E8E84-426E-40DD-AFC4-6F175D3DCCD1}">
-              <a14:hiddenFill xmlns:a14="http://schemas.microsoft.com/office/drawing/2010/main">
-                <a:solidFill>
-                  <a:srgbClr val="FFFFFF"/>
-                </a:solidFill>
-              </a14:hiddenFill>
-            </a:ext>
-          </a:extLst>
-        </p:spPr>
-      </p:pic>
-      <p:sp>
-        <p:nvSpPr>
-          <p:cNvPr id="4" name="TextBox 3"/>
-          <p:cNvSpPr txBox="1"/>
-          <p:nvPr/>
+              <a:t>Object Oriented Programming</a:t>
+            </a:r>
+            <a:endParaRPr lang="en-US" dirty="0"/>
+          </a:p>
+        </p:txBody>
+      </p:sp>
+      <p:sp>
+        <p:nvSpPr>
+          <p:cNvPr id="3" name="Content Placeholder 2"/>
+          <p:cNvSpPr>
+            <a:spLocks noGrp="1"/>
+          </p:cNvSpPr>
+          <p:nvPr>
+            <p:ph idx="1"/>
+          </p:nvPr>
         </p:nvSpPr>
         <p:spPr>
           <a:xfrm>
-            <a:off x="3808324" y="2140299"/>
-            <a:ext cx="4943790" cy="3970318"/>
+            <a:off x="840000" y="2029767"/>
+            <a:ext cx="7675350" cy="4451420"/>
           </a:xfrm>
-          <a:prstGeom prst="rect">
-            <a:avLst/>
-          </a:prstGeom>
-          <a:noFill/>
         </p:spPr>
         <p:txBody>
-          <a:bodyPr wrap="square" rtlCol="0">
-            <a:spAutoFit/>
+          <a:bodyPr>
+            <a:normAutofit lnSpcReduction="10000"/>
           </a:bodyPr>
           <a:lstStyle/>
           <a:p>
-            <a:pPr>
-              <a:lnSpc>
-                <a:spcPct val="150000"/>
-              </a:lnSpc>
-            </a:pPr>
-            <a:r>
-              <a:rPr lang="en-US" sz="2400" dirty="0" smtClean="0"/>
-              <a:t>Reformatting </a:t>
-            </a:r>
-            <a:r>
-              <a:rPr lang="en-US" sz="2400" dirty="0"/>
-              <a:t>data with </a:t>
-            </a:r>
-            <a:r>
-              <a:rPr lang="en-US" sz="2400" dirty="0" smtClean="0"/>
-              <a:t>regex</a:t>
-            </a:r>
-            <a:endParaRPr lang="en-US" sz="2400" dirty="0"/>
-          </a:p>
-          <a:p>
-            <a:pPr>
-              <a:lnSpc>
-                <a:spcPct val="150000"/>
-              </a:lnSpc>
-            </a:pPr>
-            <a:r>
-              <a:rPr lang="en-US" sz="2400" dirty="0" smtClean="0"/>
-              <a:t>The </a:t>
-            </a:r>
-            <a:r>
-              <a:rPr lang="en-US" sz="2400" dirty="0"/>
-              <a:t>Unix command </a:t>
-            </a:r>
-            <a:r>
-              <a:rPr lang="en-US" sz="2400" dirty="0" smtClean="0"/>
-              <a:t>line</a:t>
-            </a:r>
-            <a:endParaRPr lang="en-US" sz="2400" dirty="0"/>
-          </a:p>
-          <a:p>
-            <a:pPr>
-              <a:lnSpc>
-                <a:spcPct val="150000"/>
-              </a:lnSpc>
-            </a:pPr>
-            <a:r>
-              <a:rPr lang="en-US" sz="2400" dirty="0" smtClean="0"/>
-              <a:t>Combining </a:t>
-            </a:r>
-            <a:r>
-              <a:rPr lang="en-US" sz="2400" dirty="0"/>
-              <a:t>and automating </a:t>
-            </a:r>
-            <a:r>
-              <a:rPr lang="en-US" sz="2400" dirty="0" smtClean="0"/>
-              <a:t>analyses</a:t>
-            </a:r>
-            <a:endParaRPr lang="en-US" sz="2400" dirty="0"/>
-          </a:p>
-          <a:p>
-            <a:pPr>
-              <a:lnSpc>
-                <a:spcPct val="150000"/>
-              </a:lnSpc>
-            </a:pPr>
-            <a:r>
-              <a:rPr lang="en-US" sz="2400" dirty="0" smtClean="0"/>
-              <a:t>Python </a:t>
-            </a:r>
-            <a:r>
-              <a:rPr lang="en-US" sz="2400" dirty="0"/>
-              <a:t>programming and </a:t>
-            </a:r>
-            <a:r>
-              <a:rPr lang="en-US" sz="2400" dirty="0" smtClean="0"/>
-              <a:t>debugging</a:t>
-            </a:r>
-            <a:endParaRPr lang="en-US" sz="2400" dirty="0"/>
-          </a:p>
-          <a:p>
-            <a:pPr>
-              <a:lnSpc>
-                <a:spcPct val="150000"/>
-              </a:lnSpc>
-            </a:pPr>
-            <a:r>
-              <a:rPr lang="en-US" sz="2400" dirty="0" smtClean="0"/>
-              <a:t>Creating </a:t>
-            </a:r>
-            <a:r>
-              <a:rPr lang="en-US" sz="2400" dirty="0"/>
-              <a:t>and editing </a:t>
-            </a:r>
-            <a:r>
-              <a:rPr lang="en-US" sz="2400" dirty="0" smtClean="0"/>
-              <a:t>graphics</a:t>
-            </a:r>
-            <a:endParaRPr lang="en-US" sz="2400" dirty="0"/>
-          </a:p>
-          <a:p>
-            <a:pPr>
-              <a:lnSpc>
-                <a:spcPct val="150000"/>
-              </a:lnSpc>
-            </a:pPr>
-            <a:r>
-              <a:rPr lang="en-US" sz="2400" dirty="0" smtClean="0"/>
-              <a:t>Databases</a:t>
-            </a:r>
-            <a:endParaRPr lang="en-US" sz="2400" dirty="0"/>
-          </a:p>
-          <a:p>
-            <a:pPr>
-              <a:lnSpc>
-                <a:spcPct val="150000"/>
-              </a:lnSpc>
-            </a:pPr>
-            <a:r>
-              <a:rPr lang="en-US" sz="2400" dirty="0" smtClean="0"/>
-              <a:t>Performing </a:t>
-            </a:r>
-            <a:r>
-              <a:rPr lang="en-US" sz="2400" dirty="0"/>
-              <a:t>analyses </a:t>
-            </a:r>
-            <a:r>
-              <a:rPr lang="en-US" sz="2400" dirty="0" smtClean="0"/>
-              <a:t>remotely</a:t>
-            </a:r>
-            <a:endParaRPr lang="en-US" sz="2400" dirty="0"/>
+            <a:r>
+              <a:rPr lang="en-US" dirty="0" smtClean="0"/>
+              <a:t>Objects hold information</a:t>
+            </a:r>
+          </a:p>
+          <a:p>
+            <a:endParaRPr lang="en-US" dirty="0" smtClean="0"/>
+          </a:p>
+          <a:p>
+            <a:r>
+              <a:rPr lang="en-US" dirty="0" smtClean="0"/>
+              <a:t>They can contain values</a:t>
+            </a:r>
+          </a:p>
+          <a:p>
+            <a:endParaRPr lang="en-US" dirty="0" smtClean="0"/>
+          </a:p>
+          <a:p>
+            <a:r>
+              <a:rPr lang="en-US" dirty="0" smtClean="0"/>
+              <a:t>They can contain multiple values</a:t>
+            </a:r>
+            <a:endParaRPr lang="en-US" dirty="0"/>
+          </a:p>
+          <a:p>
+            <a:endParaRPr lang="en-US" dirty="0" smtClean="0"/>
+          </a:p>
+          <a:p>
+            <a:r>
+              <a:rPr lang="en-US" dirty="0" smtClean="0"/>
+              <a:t>They can contain </a:t>
+            </a:r>
+            <a:r>
+              <a:rPr lang="en-US" i="1" dirty="0" smtClean="0"/>
+              <a:t>other objects</a:t>
+            </a:r>
+            <a:endParaRPr lang="en-US" dirty="0" smtClean="0"/>
+          </a:p>
+          <a:p>
+            <a:endParaRPr lang="en-US" dirty="0" smtClean="0"/>
+          </a:p>
+          <a:p>
+            <a:r>
+              <a:rPr lang="en-US" dirty="0" smtClean="0"/>
+              <a:t>They have types</a:t>
+            </a:r>
+          </a:p>
+          <a:p>
+            <a:endParaRPr lang="en-US" dirty="0" smtClean="0"/>
+          </a:p>
+          <a:p>
+            <a:r>
+              <a:rPr lang="en-US" dirty="0" smtClean="0"/>
+              <a:t>They can inherit information from others</a:t>
+            </a:r>
           </a:p>
         </p:txBody>
       </p:sp>
     </p:spTree>
     <p:extLst>
       <p:ext uri="{BB962C8B-B14F-4D97-AF65-F5344CB8AC3E}">
-        <p14:creationId xmlns:p14="http://schemas.microsoft.com/office/powerpoint/2010/main" val="480673781"/>
+        <p14:creationId xmlns:p14="http://schemas.microsoft.com/office/powerpoint/2010/main" val="4039615631"/>
       </p:ext>
     </p:extLst>
   </p:cSld>

</xml_diff>